<commit_message>
Cleaned up the pretty presentation.
</commit_message>
<xml_diff>
--- a/Documents/MICS/MICSPrezAndrewVersion.pptx
+++ b/Documents/MICS/MICSPrezAndrewVersion.pptx
@@ -4791,11 +4791,7 @@
           <a:p>
             <a:r>
               <a:rPr lang="en-US" dirty="0" smtClean="0"/>
-              <a:t> and </a:t>
-            </a:r>
-            <a:r>
-              <a:rPr lang="en-US" dirty="0" smtClean="0"/>
-              <a:t>Andrew the Hoover</a:t>
+              <a:t> and Andrew the Hoover</a:t>
             </a:r>
             <a:endParaRPr lang="en-US" dirty="0"/>
           </a:p>
@@ -5894,11 +5890,15 @@
           <a:p>
             <a:r>
               <a:rPr lang="en-US" dirty="0" err="1" smtClean="0"/>
-              <a:t>PcDruino</a:t>
-            </a:r>
-            <a:r>
-              <a:rPr lang="en-US" dirty="0" smtClean="0"/>
-              <a:t> not available</a:t>
+              <a:t>PcDuino</a:t>
+            </a:r>
+            <a:r>
+              <a:rPr lang="en-US" dirty="0" smtClean="0"/>
+              <a:t> </a:t>
+            </a:r>
+            <a:r>
+              <a:rPr lang="en-US" dirty="0" smtClean="0"/>
+              <a:t>not available</a:t>
             </a:r>
           </a:p>
           <a:p>
@@ -5932,22 +5932,14 @@
             <a:pPr lvl="1"/>
             <a:r>
               <a:rPr lang="en-US" dirty="0" smtClean="0"/>
-              <a:t>1 GM </a:t>
-            </a:r>
-            <a:r>
-              <a:rPr lang="en-US" dirty="0" smtClean="0"/>
-              <a:t>memory</a:t>
+              <a:t>1 GM memory</a:t>
             </a:r>
           </a:p>
           <a:p>
             <a:pPr lvl="1"/>
             <a:r>
               <a:rPr lang="en-US" dirty="0" smtClean="0"/>
-              <a:t>1 </a:t>
-            </a:r>
-            <a:r>
-              <a:rPr lang="en-US" dirty="0" smtClean="0"/>
-              <a:t>Gigabit Ethernet</a:t>
+              <a:t>1 Gigabit Ethernet</a:t>
             </a:r>
             <a:endParaRPr lang="en-US" dirty="0"/>
           </a:p>

</xml_diff>